<commit_message>
push exercise menu + solution
</commit_message>
<xml_diff>
--- a/presenter_fr.pptx
+++ b/presenter_fr.pptx
@@ -646,7 +646,7 @@
           <a:p>
             <a:fld id="{7E97AD98-B9C0-48D6-BE04-54ABC792AF9B}" type="datetimeFigureOut">
               <a:rPr lang="en-US" smtClean="0"/>
-              <a:t>9/21/2022</a:t>
+              <a:t>9/22/2022</a:t>
             </a:fld>
             <a:endParaRPr lang="en-US"/>
           </a:p>
@@ -842,7 +842,7 @@
           <a:p>
             <a:fld id="{7E97AD98-B9C0-48D6-BE04-54ABC792AF9B}" type="datetimeFigureOut">
               <a:rPr lang="en-US" smtClean="0"/>
-              <a:t>9/21/2022</a:t>
+              <a:t>9/22/2022</a:t>
             </a:fld>
             <a:endParaRPr lang="en-US"/>
           </a:p>
@@ -1022,7 +1022,7 @@
           <a:p>
             <a:fld id="{7E97AD98-B9C0-48D6-BE04-54ABC792AF9B}" type="datetimeFigureOut">
               <a:rPr lang="en-US" smtClean="0"/>
-              <a:t>9/21/2022</a:t>
+              <a:t>9/22/2022</a:t>
             </a:fld>
             <a:endParaRPr lang="en-US"/>
           </a:p>
@@ -1192,7 +1192,7 @@
           <a:p>
             <a:fld id="{7E97AD98-B9C0-48D6-BE04-54ABC792AF9B}" type="datetimeFigureOut">
               <a:rPr lang="en-US" smtClean="0"/>
-              <a:t>9/21/2022</a:t>
+              <a:t>9/22/2022</a:t>
             </a:fld>
             <a:endParaRPr lang="en-US"/>
           </a:p>
@@ -1805,7 +1805,7 @@
           <a:p>
             <a:fld id="{7E97AD98-B9C0-48D6-BE04-54ABC792AF9B}" type="datetimeFigureOut">
               <a:rPr lang="en-US" smtClean="0"/>
-              <a:t>9/21/2022</a:t>
+              <a:t>9/22/2022</a:t>
             </a:fld>
             <a:endParaRPr lang="en-US"/>
           </a:p>
@@ -2119,7 +2119,7 @@
           <a:p>
             <a:fld id="{7E97AD98-B9C0-48D6-BE04-54ABC792AF9B}" type="datetimeFigureOut">
               <a:rPr lang="en-US" smtClean="0"/>
-              <a:t>9/21/2022</a:t>
+              <a:t>9/22/2022</a:t>
             </a:fld>
             <a:endParaRPr lang="en-US"/>
           </a:p>
@@ -2556,7 +2556,7 @@
           <a:p>
             <a:fld id="{7E97AD98-B9C0-48D6-BE04-54ABC792AF9B}" type="datetimeFigureOut">
               <a:rPr lang="en-US" smtClean="0"/>
-              <a:t>9/21/2022</a:t>
+              <a:t>9/22/2022</a:t>
             </a:fld>
             <a:endParaRPr lang="en-US"/>
           </a:p>
@@ -2674,7 +2674,7 @@
           <a:p>
             <a:fld id="{7E97AD98-B9C0-48D6-BE04-54ABC792AF9B}" type="datetimeFigureOut">
               <a:rPr lang="en-US" smtClean="0"/>
-              <a:t>9/21/2022</a:t>
+              <a:t>9/22/2022</a:t>
             </a:fld>
             <a:endParaRPr lang="en-US"/>
           </a:p>
@@ -2769,7 +2769,7 @@
           <a:p>
             <a:fld id="{7E97AD98-B9C0-48D6-BE04-54ABC792AF9B}" type="datetimeFigureOut">
               <a:rPr lang="en-US" smtClean="0"/>
-              <a:t>9/21/2022</a:t>
+              <a:t>9/22/2022</a:t>
             </a:fld>
             <a:endParaRPr lang="en-US"/>
           </a:p>
@@ -3154,7 +3154,7 @@
           <a:p>
             <a:fld id="{7E97AD98-B9C0-48D6-BE04-54ABC792AF9B}" type="datetimeFigureOut">
               <a:rPr lang="en-US" smtClean="0"/>
-              <a:t>9/21/2022</a:t>
+              <a:t>9/22/2022</a:t>
             </a:fld>
             <a:endParaRPr lang="en-US"/>
           </a:p>
@@ -3535,7 +3535,7 @@
           <a:p>
             <a:fld id="{7E97AD98-B9C0-48D6-BE04-54ABC792AF9B}" type="datetimeFigureOut">
               <a:rPr lang="en-US" smtClean="0"/>
-              <a:t>9/21/2022</a:t>
+              <a:t>9/22/2022</a:t>
             </a:fld>
             <a:endParaRPr lang="en-US"/>
           </a:p>
@@ -3804,7 +3804,7 @@
           <a:p>
             <a:fld id="{7E97AD98-B9C0-48D6-BE04-54ABC792AF9B}" type="datetimeFigureOut">
               <a:rPr lang="en-US" smtClean="0"/>
-              <a:t>9/21/2022</a:t>
+              <a:t>9/22/2022</a:t>
             </a:fld>
             <a:endParaRPr lang="en-US"/>
           </a:p>
@@ -14616,27 +14616,27 @@
           <a:lstStyle/>
           <a:p>
             <a:r>
-              <a:rPr lang="fr-FR" sz="2800"/>
+              <a:rPr lang="fr-FR" sz="2400"/>
               <a:t>HTML (HyperText Markup </a:t>
             </a:r>
             <a:r>
-              <a:rPr lang="fr-FR" sz="2800" err="1"/>
+              <a:rPr lang="fr-FR" sz="2400" err="1"/>
               <a:t>Language</a:t>
             </a:r>
             <a:r>
-              <a:rPr lang="fr-FR" sz="2800"/>
+              <a:rPr lang="fr-FR" sz="2400"/>
               <a:t>) décrit le contenu de pages web sous forme de </a:t>
             </a:r>
             <a:r>
-              <a:rPr lang="fr-FR" sz="2800" b="1"/>
+              <a:rPr lang="fr-FR" sz="2400" b="1"/>
               <a:t>balises</a:t>
             </a:r>
             <a:r>
-              <a:rPr lang="fr-FR" sz="2800"/>
+              <a:rPr lang="fr-FR" sz="2400"/>
               <a:t> imbriquées dans une </a:t>
             </a:r>
             <a:r>
-              <a:rPr lang="fr-FR" sz="2800" b="1"/>
+              <a:rPr lang="fr-FR" sz="2400" b="1"/>
               <a:t>structure d’arbre</a:t>
             </a:r>
           </a:p>
@@ -14655,7 +14655,7 @@
           <a:p>
             <a:r>
               <a:rPr lang="fr-FR" sz="2400"/>
-              <a:t>Il existe un ensemble de balises standardisées avec chacun leur cas d’utilisation (</a:t>
+              <a:t>Il existe un ensemble de balises standardisées avec chacune leur cas d’utilisation (</a:t>
             </a:r>
             <a:r>
               <a:rPr lang="fr-FR" sz="2400">
@@ -14702,7 +14702,7 @@
         </p:blipFill>
         <p:spPr bwMode="auto">
           <a:xfrm>
-            <a:off x="3333734" y="3315797"/>
+            <a:off x="3190313" y="2792423"/>
             <a:ext cx="5800725" cy="1724025"/>
           </a:xfrm>
           <a:prstGeom prst="rect">

</xml_diff>

<commit_message>
update slides & cheat sheet
</commit_message>
<xml_diff>
--- a/presenter_fr.pptx
+++ b/presenter_fr.pptx
@@ -646,7 +646,7 @@
           <a:p>
             <a:fld id="{7E97AD98-B9C0-48D6-BE04-54ABC792AF9B}" type="datetimeFigureOut">
               <a:rPr lang="en-US" smtClean="0"/>
-              <a:t>5/11/2023</a:t>
+              <a:t>11/28/2023</a:t>
             </a:fld>
             <a:endParaRPr lang="en-US"/>
           </a:p>
@@ -842,7 +842,7 @@
           <a:p>
             <a:fld id="{7E97AD98-B9C0-48D6-BE04-54ABC792AF9B}" type="datetimeFigureOut">
               <a:rPr lang="en-US" smtClean="0"/>
-              <a:t>5/11/2023</a:t>
+              <a:t>11/28/2023</a:t>
             </a:fld>
             <a:endParaRPr lang="en-US"/>
           </a:p>
@@ -1022,7 +1022,7 @@
           <a:p>
             <a:fld id="{7E97AD98-B9C0-48D6-BE04-54ABC792AF9B}" type="datetimeFigureOut">
               <a:rPr lang="en-US" smtClean="0"/>
-              <a:t>5/11/2023</a:t>
+              <a:t>11/28/2023</a:t>
             </a:fld>
             <a:endParaRPr lang="en-US"/>
           </a:p>
@@ -1192,7 +1192,7 @@
           <a:p>
             <a:fld id="{7E97AD98-B9C0-48D6-BE04-54ABC792AF9B}" type="datetimeFigureOut">
               <a:rPr lang="en-US" smtClean="0"/>
-              <a:t>5/11/2023</a:t>
+              <a:t>11/28/2023</a:t>
             </a:fld>
             <a:endParaRPr lang="en-US"/>
           </a:p>
@@ -1805,7 +1805,7 @@
           <a:p>
             <a:fld id="{7E97AD98-B9C0-48D6-BE04-54ABC792AF9B}" type="datetimeFigureOut">
               <a:rPr lang="en-US" smtClean="0"/>
-              <a:t>5/11/2023</a:t>
+              <a:t>11/28/2023</a:t>
             </a:fld>
             <a:endParaRPr lang="en-US"/>
           </a:p>
@@ -2119,7 +2119,7 @@
           <a:p>
             <a:fld id="{7E97AD98-B9C0-48D6-BE04-54ABC792AF9B}" type="datetimeFigureOut">
               <a:rPr lang="en-US" smtClean="0"/>
-              <a:t>5/11/2023</a:t>
+              <a:t>11/28/2023</a:t>
             </a:fld>
             <a:endParaRPr lang="en-US"/>
           </a:p>
@@ -2556,7 +2556,7 @@
           <a:p>
             <a:fld id="{7E97AD98-B9C0-48D6-BE04-54ABC792AF9B}" type="datetimeFigureOut">
               <a:rPr lang="en-US" smtClean="0"/>
-              <a:t>5/11/2023</a:t>
+              <a:t>11/28/2023</a:t>
             </a:fld>
             <a:endParaRPr lang="en-US"/>
           </a:p>
@@ -2674,7 +2674,7 @@
           <a:p>
             <a:fld id="{7E97AD98-B9C0-48D6-BE04-54ABC792AF9B}" type="datetimeFigureOut">
               <a:rPr lang="en-US" smtClean="0"/>
-              <a:t>5/11/2023</a:t>
+              <a:t>11/28/2023</a:t>
             </a:fld>
             <a:endParaRPr lang="en-US"/>
           </a:p>
@@ -2769,7 +2769,7 @@
           <a:p>
             <a:fld id="{7E97AD98-B9C0-48D6-BE04-54ABC792AF9B}" type="datetimeFigureOut">
               <a:rPr lang="en-US" smtClean="0"/>
-              <a:t>5/11/2023</a:t>
+              <a:t>11/28/2023</a:t>
             </a:fld>
             <a:endParaRPr lang="en-US"/>
           </a:p>
@@ -3154,7 +3154,7 @@
           <a:p>
             <a:fld id="{7E97AD98-B9C0-48D6-BE04-54ABC792AF9B}" type="datetimeFigureOut">
               <a:rPr lang="en-US" smtClean="0"/>
-              <a:t>5/11/2023</a:t>
+              <a:t>11/28/2023</a:t>
             </a:fld>
             <a:endParaRPr lang="en-US"/>
           </a:p>
@@ -3535,7 +3535,7 @@
           <a:p>
             <a:fld id="{7E97AD98-B9C0-48D6-BE04-54ABC792AF9B}" type="datetimeFigureOut">
               <a:rPr lang="en-US" smtClean="0"/>
-              <a:t>5/11/2023</a:t>
+              <a:t>11/28/2023</a:t>
             </a:fld>
             <a:endParaRPr lang="en-US"/>
           </a:p>
@@ -3804,7 +3804,7 @@
           <a:p>
             <a:fld id="{7E97AD98-B9C0-48D6-BE04-54ABC792AF9B}" type="datetimeFigureOut">
               <a:rPr lang="en-US" smtClean="0"/>
-              <a:t>5/11/2023</a:t>
+              <a:t>11/28/2023</a:t>
             </a:fld>
             <a:endParaRPr lang="en-US"/>
           </a:p>
@@ -14723,6 +14723,7 @@
       <p:sp>
         <p:nvSpPr>
           <p:cNvPr id="5" name="Flèche : droite 4">
+            <a:hlinkClick r:id="rId4"/>
             <a:extLst>
               <a:ext uri="{FF2B5EF4-FFF2-40B4-BE49-F238E27FC236}">
                 <a16:creationId xmlns:a16="http://schemas.microsoft.com/office/drawing/2014/main" id="{98572F4E-A874-4701-B006-C4E5BE1F7931}"/>

</xml_diff>